<commit_message>
add to front page
</commit_message>
<xml_diff>
--- a/docs/presentations/day 1/9-15--10-00_workshop into/workshop-intro.pptx
+++ b/docs/presentations/day 1/9-15--10-00_workshop into/workshop-intro.pptx
@@ -12,10 +12,12 @@
     <p:sldId id="389" r:id="rId6"/>
     <p:sldId id="258" r:id="rId7"/>
     <p:sldId id="263" r:id="rId8"/>
-    <p:sldId id="259" r:id="rId9"/>
-    <p:sldId id="260" r:id="rId10"/>
-    <p:sldId id="261" r:id="rId11"/>
-    <p:sldId id="262" r:id="rId12"/>
+    <p:sldId id="391" r:id="rId9"/>
+    <p:sldId id="390" r:id="rId10"/>
+    <p:sldId id="259" r:id="rId11"/>
+    <p:sldId id="260" r:id="rId12"/>
+    <p:sldId id="261" r:id="rId13"/>
+    <p:sldId id="262" r:id="rId14"/>
   </p:sldIdLst>
   <p:sldSz cx="12192000" cy="6858000"/>
   <p:notesSz cx="6858000" cy="9144000"/>
@@ -271,7 +273,7 @@
           <a:p>
             <a:fld id="{4CD68560-5568-47C2-9996-B64EEB68DDBD}" type="datetimeFigureOut">
               <a:rPr lang="en-GB" smtClean="0"/>
-              <a:t>12/09/2019</a:t>
+              <a:t>16/09/2019</a:t>
             </a:fld>
             <a:endParaRPr lang="en-GB"/>
           </a:p>
@@ -471,7 +473,7 @@
           <a:p>
             <a:fld id="{4CD68560-5568-47C2-9996-B64EEB68DDBD}" type="datetimeFigureOut">
               <a:rPr lang="en-GB" smtClean="0"/>
-              <a:t>12/09/2019</a:t>
+              <a:t>16/09/2019</a:t>
             </a:fld>
             <a:endParaRPr lang="en-GB"/>
           </a:p>
@@ -681,7 +683,7 @@
           <a:p>
             <a:fld id="{4CD68560-5568-47C2-9996-B64EEB68DDBD}" type="datetimeFigureOut">
               <a:rPr lang="en-GB" smtClean="0"/>
-              <a:t>12/09/2019</a:t>
+              <a:t>16/09/2019</a:t>
             </a:fld>
             <a:endParaRPr lang="en-GB"/>
           </a:p>
@@ -3497,7 +3499,7 @@
           <a:p>
             <a:fld id="{4CD68560-5568-47C2-9996-B64EEB68DDBD}" type="datetimeFigureOut">
               <a:rPr lang="en-GB" smtClean="0"/>
-              <a:t>12/09/2019</a:t>
+              <a:t>16/09/2019</a:t>
             </a:fld>
             <a:endParaRPr lang="en-GB"/>
           </a:p>
@@ -4623,7 +4625,7 @@
           <a:p>
             <a:fld id="{1D8BD707-D9CF-40AE-B4C6-C98DA3205C09}" type="datetimeFigureOut">
               <a:rPr lang="en-US"/>
-              <a:t>9/12/2019</a:t>
+              <a:t>9/16/2019</a:t>
             </a:fld>
             <a:endParaRPr lang="en-US"/>
           </a:p>
@@ -4877,7 +4879,7 @@
           <a:p>
             <a:fld id="{4CD68560-5568-47C2-9996-B64EEB68DDBD}" type="datetimeFigureOut">
               <a:rPr lang="en-GB" smtClean="0"/>
-              <a:t>12/09/2019</a:t>
+              <a:t>16/09/2019</a:t>
             </a:fld>
             <a:endParaRPr lang="en-GB"/>
           </a:p>
@@ -5145,7 +5147,7 @@
           <a:p>
             <a:fld id="{4CD68560-5568-47C2-9996-B64EEB68DDBD}" type="datetimeFigureOut">
               <a:rPr lang="en-GB" smtClean="0"/>
-              <a:t>12/09/2019</a:t>
+              <a:t>16/09/2019</a:t>
             </a:fld>
             <a:endParaRPr lang="en-GB"/>
           </a:p>
@@ -5560,7 +5562,7 @@
           <a:p>
             <a:fld id="{4CD68560-5568-47C2-9996-B64EEB68DDBD}" type="datetimeFigureOut">
               <a:rPr lang="en-GB" smtClean="0"/>
-              <a:t>12/09/2019</a:t>
+              <a:t>16/09/2019</a:t>
             </a:fld>
             <a:endParaRPr lang="en-GB"/>
           </a:p>
@@ -5702,7 +5704,7 @@
           <a:p>
             <a:fld id="{4CD68560-5568-47C2-9996-B64EEB68DDBD}" type="datetimeFigureOut">
               <a:rPr lang="en-GB" smtClean="0"/>
-              <a:t>12/09/2019</a:t>
+              <a:t>16/09/2019</a:t>
             </a:fld>
             <a:endParaRPr lang="en-GB"/>
           </a:p>
@@ -5815,7 +5817,7 @@
           <a:p>
             <a:fld id="{4CD68560-5568-47C2-9996-B64EEB68DDBD}" type="datetimeFigureOut">
               <a:rPr lang="en-GB" smtClean="0"/>
-              <a:t>12/09/2019</a:t>
+              <a:t>16/09/2019</a:t>
             </a:fld>
             <a:endParaRPr lang="en-GB"/>
           </a:p>
@@ -6128,7 +6130,7 @@
           <a:p>
             <a:fld id="{4CD68560-5568-47C2-9996-B64EEB68DDBD}" type="datetimeFigureOut">
               <a:rPr lang="en-GB" smtClean="0"/>
-              <a:t>12/09/2019</a:t>
+              <a:t>16/09/2019</a:t>
             </a:fld>
             <a:endParaRPr lang="en-GB"/>
           </a:p>
@@ -6417,7 +6419,7 @@
           <a:p>
             <a:fld id="{4CD68560-5568-47C2-9996-B64EEB68DDBD}" type="datetimeFigureOut">
               <a:rPr lang="en-GB" smtClean="0"/>
-              <a:t>12/09/2019</a:t>
+              <a:t>16/09/2019</a:t>
             </a:fld>
             <a:endParaRPr lang="en-GB"/>
           </a:p>
@@ -6660,7 +6662,7 @@
           <a:p>
             <a:fld id="{4CD68560-5568-47C2-9996-B64EEB68DDBD}" type="datetimeFigureOut">
               <a:rPr lang="en-GB" smtClean="0"/>
-              <a:t>12/09/2019</a:t>
+              <a:t>16/09/2019</a:t>
             </a:fld>
             <a:endParaRPr lang="en-GB"/>
           </a:p>
@@ -7836,6 +7838,226 @@
           <p:cNvPr id="2" name="Title 1">
             <a:extLst>
               <a:ext uri="{FF2B5EF4-FFF2-40B4-BE49-F238E27FC236}">
+                <a16:creationId xmlns:a16="http://schemas.microsoft.com/office/drawing/2014/main" id="{9E87F50E-B545-48D3-9E91-447452099F84}"/>
+              </a:ext>
+            </a:extLst>
+          </p:cNvPr>
+          <p:cNvSpPr>
+            <a:spLocks noGrp="1"/>
+          </p:cNvSpPr>
+          <p:nvPr>
+            <p:ph type="title"/>
+          </p:nvPr>
+        </p:nvSpPr>
+        <p:spPr/>
+        <p:txBody>
+          <a:bodyPr/>
+          <a:lstStyle/>
+          <a:p>
+            <a:endParaRPr lang="en-GB"/>
+          </a:p>
+        </p:txBody>
+      </p:sp>
+      <p:sp>
+        <p:nvSpPr>
+          <p:cNvPr id="3" name="Content Placeholder 2">
+            <a:extLst>
+              <a:ext uri="{FF2B5EF4-FFF2-40B4-BE49-F238E27FC236}">
+                <a16:creationId xmlns:a16="http://schemas.microsoft.com/office/drawing/2014/main" id="{39640367-5016-4745-9C2A-DB9928419484}"/>
+              </a:ext>
+            </a:extLst>
+          </p:cNvPr>
+          <p:cNvSpPr>
+            <a:spLocks noGrp="1"/>
+          </p:cNvSpPr>
+          <p:nvPr>
+            <p:ph idx="1"/>
+          </p:nvPr>
+        </p:nvSpPr>
+        <p:spPr/>
+        <p:txBody>
+          <a:bodyPr/>
+          <a:lstStyle/>
+          <a:p>
+            <a:endParaRPr lang="en-GB"/>
+          </a:p>
+        </p:txBody>
+      </p:sp>
+      <p:pic>
+        <p:nvPicPr>
+          <p:cNvPr id="4" name="Picture 3">
+            <a:extLst>
+              <a:ext uri="{FF2B5EF4-FFF2-40B4-BE49-F238E27FC236}">
+                <a16:creationId xmlns:a16="http://schemas.microsoft.com/office/drawing/2014/main" id="{8A395C2F-E2A4-4F09-9799-3353BB0148E9}"/>
+              </a:ext>
+            </a:extLst>
+          </p:cNvPr>
+          <p:cNvPicPr>
+            <a:picLocks noChangeAspect="1"/>
+          </p:cNvPicPr>
+          <p:nvPr/>
+        </p:nvPicPr>
+        <p:blipFill>
+          <a:blip r:embed="rId2"/>
+          <a:stretch>
+            <a:fillRect/>
+          </a:stretch>
+        </p:blipFill>
+        <p:spPr>
+          <a:xfrm>
+            <a:off x="4176416" y="0"/>
+            <a:ext cx="3839167" cy="6858000"/>
+          </a:xfrm>
+          <a:prstGeom prst="rect">
+            <a:avLst/>
+          </a:prstGeom>
+        </p:spPr>
+      </p:pic>
+    </p:spTree>
+    <p:extLst>
+      <p:ext uri="{BB962C8B-B14F-4D97-AF65-F5344CB8AC3E}">
+        <p14:creationId xmlns:p14="http://schemas.microsoft.com/office/powerpoint/2010/main" val="2090405719"/>
+      </p:ext>
+    </p:extLst>
+  </p:cSld>
+  <p:clrMapOvr>
+    <a:masterClrMapping/>
+  </p:clrMapOvr>
+</p:sld>
+</file>
+
+<file path=ppt/slides/slide11.xml><?xml version="1.0" encoding="utf-8"?>
+<p:sld xmlns:a="http://schemas.openxmlformats.org/drawingml/2006/main" xmlns:r="http://schemas.openxmlformats.org/officeDocument/2006/relationships" xmlns:p="http://schemas.openxmlformats.org/presentationml/2006/main">
+  <p:cSld>
+    <p:spTree>
+      <p:nvGrpSpPr>
+        <p:cNvPr id="1" name=""/>
+        <p:cNvGrpSpPr/>
+        <p:nvPr/>
+      </p:nvGrpSpPr>
+      <p:grpSpPr>
+        <a:xfrm>
+          <a:off x="0" y="0"/>
+          <a:ext cx="0" cy="0"/>
+          <a:chOff x="0" y="0"/>
+          <a:chExt cx="0" cy="0"/>
+        </a:xfrm>
+      </p:grpSpPr>
+      <p:sp>
+        <p:nvSpPr>
+          <p:cNvPr id="2" name="Title 1">
+            <a:extLst>
+              <a:ext uri="{FF2B5EF4-FFF2-40B4-BE49-F238E27FC236}">
+                <a16:creationId xmlns:a16="http://schemas.microsoft.com/office/drawing/2014/main" id="{756F2C3F-BE2A-4D2A-8146-226D29DA6E2F}"/>
+              </a:ext>
+            </a:extLst>
+          </p:cNvPr>
+          <p:cNvSpPr>
+            <a:spLocks noGrp="1"/>
+          </p:cNvSpPr>
+          <p:nvPr>
+            <p:ph type="title"/>
+          </p:nvPr>
+        </p:nvSpPr>
+        <p:spPr/>
+        <p:txBody>
+          <a:bodyPr/>
+          <a:lstStyle/>
+          <a:p>
+            <a:r>
+              <a:rPr lang="en-GB" dirty="0"/>
+              <a:t>Code of conduct</a:t>
+            </a:r>
+          </a:p>
+        </p:txBody>
+      </p:sp>
+      <p:sp>
+        <p:nvSpPr>
+          <p:cNvPr id="3" name="Content Placeholder 2">
+            <a:extLst>
+              <a:ext uri="{FF2B5EF4-FFF2-40B4-BE49-F238E27FC236}">
+                <a16:creationId xmlns:a16="http://schemas.microsoft.com/office/drawing/2014/main" id="{E7BD1712-A824-464D-AE89-E9615CDCE38F}"/>
+              </a:ext>
+            </a:extLst>
+          </p:cNvPr>
+          <p:cNvSpPr>
+            <a:spLocks noGrp="1"/>
+          </p:cNvSpPr>
+          <p:nvPr>
+            <p:ph idx="1"/>
+          </p:nvPr>
+        </p:nvSpPr>
+        <p:spPr/>
+        <p:txBody>
+          <a:bodyPr/>
+          <a:lstStyle/>
+          <a:p>
+            <a:r>
+              <a:rPr lang="en-GB" dirty="0"/>
+              <a:t>Please ask questions</a:t>
+            </a:r>
+          </a:p>
+          <a:p>
+            <a:r>
+              <a:rPr lang="en-GB" dirty="0"/>
+              <a:t>Be curious</a:t>
+            </a:r>
+          </a:p>
+          <a:p>
+            <a:r>
+              <a:rPr lang="en-GB" dirty="0"/>
+              <a:t>Make mistakes</a:t>
+            </a:r>
+          </a:p>
+          <a:p>
+            <a:r>
+              <a:rPr lang="en-GB" dirty="0"/>
+              <a:t>Practices makes perfect</a:t>
+            </a:r>
+          </a:p>
+          <a:p>
+            <a:r>
+              <a:rPr lang="en-GB" dirty="0"/>
+              <a:t>Have fun!</a:t>
+            </a:r>
+          </a:p>
+        </p:txBody>
+      </p:sp>
+    </p:spTree>
+    <p:extLst>
+      <p:ext uri="{BB962C8B-B14F-4D97-AF65-F5344CB8AC3E}">
+        <p14:creationId xmlns:p14="http://schemas.microsoft.com/office/powerpoint/2010/main" val="2695424799"/>
+      </p:ext>
+    </p:extLst>
+  </p:cSld>
+  <p:clrMapOvr>
+    <a:masterClrMapping/>
+  </p:clrMapOvr>
+</p:sld>
+</file>
+
+<file path=ppt/slides/slide12.xml><?xml version="1.0" encoding="utf-8"?>
+<p:sld xmlns:a="http://schemas.openxmlformats.org/drawingml/2006/main" xmlns:r="http://schemas.openxmlformats.org/officeDocument/2006/relationships" xmlns:p="http://schemas.openxmlformats.org/presentationml/2006/main">
+  <p:cSld>
+    <p:spTree>
+      <p:nvGrpSpPr>
+        <p:cNvPr id="1" name=""/>
+        <p:cNvGrpSpPr/>
+        <p:nvPr/>
+      </p:nvGrpSpPr>
+      <p:grpSpPr>
+        <a:xfrm>
+          <a:off x="0" y="0"/>
+          <a:ext cx="0" cy="0"/>
+          <a:chOff x="0" y="0"/>
+          <a:chExt cx="0" cy="0"/>
+        </a:xfrm>
+      </p:grpSpPr>
+      <p:sp>
+        <p:nvSpPr>
+          <p:cNvPr id="2" name="Title 1">
+            <a:extLst>
+              <a:ext uri="{FF2B5EF4-FFF2-40B4-BE49-F238E27FC236}">
                 <a16:creationId xmlns:a16="http://schemas.microsoft.com/office/drawing/2014/main" id="{0ADBADE6-9D41-4C02-A446-933A47D6F605}"/>
               </a:ext>
             </a:extLst>
@@ -9188,10 +9410,10 @@
       </p:sp>
       <p:pic>
         <p:nvPicPr>
-          <p:cNvPr id="4" name="Picture 3">
+          <p:cNvPr id="7" name="Picture 6">
             <a:extLst>
               <a:ext uri="{FF2B5EF4-FFF2-40B4-BE49-F238E27FC236}">
-                <a16:creationId xmlns:a16="http://schemas.microsoft.com/office/drawing/2014/main" id="{1975E94C-C278-43C4-9DD9-9BA93D10F1A8}"/>
+                <a16:creationId xmlns:a16="http://schemas.microsoft.com/office/drawing/2014/main" id="{2413480B-CE47-43ED-87EE-F7A6D4045230}"/>
               </a:ext>
             </a:extLst>
           </p:cNvPr>
@@ -9208,68 +9430,8 @@
         </p:blipFill>
         <p:spPr>
           <a:xfrm>
-            <a:off x="1417530" y="1701800"/>
-            <a:ext cx="3095625" cy="4791075"/>
-          </a:xfrm>
-          <a:prstGeom prst="rect">
-            <a:avLst/>
-          </a:prstGeom>
-        </p:spPr>
-      </p:pic>
-      <p:pic>
-        <p:nvPicPr>
-          <p:cNvPr id="5" name="Picture 4">
-            <a:extLst>
-              <a:ext uri="{FF2B5EF4-FFF2-40B4-BE49-F238E27FC236}">
-                <a16:creationId xmlns:a16="http://schemas.microsoft.com/office/drawing/2014/main" id="{B508BE58-BC78-4BE8-A2D6-C577E00FB1AA}"/>
-              </a:ext>
-            </a:extLst>
-          </p:cNvPr>
-          <p:cNvPicPr>
-            <a:picLocks noChangeAspect="1"/>
-          </p:cNvPicPr>
-          <p:nvPr/>
-        </p:nvPicPr>
-        <p:blipFill>
-          <a:blip r:embed="rId3"/>
-          <a:stretch>
-            <a:fillRect/>
-          </a:stretch>
-        </p:blipFill>
-        <p:spPr>
-          <a:xfrm>
-            <a:off x="4494952" y="1835149"/>
-            <a:ext cx="3438525" cy="4524375"/>
-          </a:xfrm>
-          <a:prstGeom prst="rect">
-            <a:avLst/>
-          </a:prstGeom>
-        </p:spPr>
-      </p:pic>
-      <p:pic>
-        <p:nvPicPr>
-          <p:cNvPr id="6" name="Picture 5">
-            <a:extLst>
-              <a:ext uri="{FF2B5EF4-FFF2-40B4-BE49-F238E27FC236}">
-                <a16:creationId xmlns:a16="http://schemas.microsoft.com/office/drawing/2014/main" id="{32ED22B3-D08A-4F3A-8E3B-C9559EC600DF}"/>
-              </a:ext>
-            </a:extLst>
-          </p:cNvPr>
-          <p:cNvPicPr>
-            <a:picLocks noChangeAspect="1"/>
-          </p:cNvPicPr>
-          <p:nvPr/>
-        </p:nvPicPr>
-        <p:blipFill>
-          <a:blip r:embed="rId4"/>
-          <a:stretch>
-            <a:fillRect/>
-          </a:stretch>
-        </p:blipFill>
-        <p:spPr>
-          <a:xfrm>
-            <a:off x="7731232" y="1825625"/>
-            <a:ext cx="6086475" cy="4419600"/>
+            <a:off x="1612733" y="1825625"/>
+            <a:ext cx="9491338" cy="4211304"/>
           </a:xfrm>
           <a:prstGeom prst="rect">
             <a:avLst/>
@@ -9311,7 +9473,7 @@
           <p:cNvPr id="2" name="Title 1">
             <a:extLst>
               <a:ext uri="{FF2B5EF4-FFF2-40B4-BE49-F238E27FC236}">
-                <a16:creationId xmlns:a16="http://schemas.microsoft.com/office/drawing/2014/main" id="{69F93677-A158-495E-A4BE-0EE7280DCFD8}"/>
+                <a16:creationId xmlns:a16="http://schemas.microsoft.com/office/drawing/2014/main" id="{F468E6B6-5E15-4AAE-941C-39E4AAE2144B}"/>
               </a:ext>
             </a:extLst>
           </p:cNvPr>
@@ -9327,10 +9489,7 @@
           <a:bodyPr/>
           <a:lstStyle/>
           <a:p>
-            <a:r>
-              <a:rPr lang="en-GB" dirty="0"/>
-              <a:t>Course website</a:t>
-            </a:r>
+            <a:endParaRPr lang="en-GB"/>
           </a:p>
         </p:txBody>
       </p:sp>
@@ -9339,7 +9498,7 @@
           <p:cNvPr id="3" name="Content Placeholder 2">
             <a:extLst>
               <a:ext uri="{FF2B5EF4-FFF2-40B4-BE49-F238E27FC236}">
-                <a16:creationId xmlns:a16="http://schemas.microsoft.com/office/drawing/2014/main" id="{C4E401E2-D5DF-48FE-9F1E-60BD72CF87E8}"/>
+                <a16:creationId xmlns:a16="http://schemas.microsoft.com/office/drawing/2014/main" id="{70D23478-67C0-4BD3-B691-24243007F781}"/>
               </a:ext>
             </a:extLst>
           </p:cNvPr>
@@ -9350,35 +9509,49 @@
             <p:ph idx="1"/>
           </p:nvPr>
         </p:nvSpPr>
+        <p:spPr/>
+        <p:txBody>
+          <a:bodyPr/>
+          <a:lstStyle/>
+          <a:p>
+            <a:endParaRPr lang="en-GB"/>
+          </a:p>
+        </p:txBody>
+      </p:sp>
+      <p:pic>
+        <p:nvPicPr>
+          <p:cNvPr id="4" name="Picture 3">
+            <a:extLst>
+              <a:ext uri="{FF2B5EF4-FFF2-40B4-BE49-F238E27FC236}">
+                <a16:creationId xmlns:a16="http://schemas.microsoft.com/office/drawing/2014/main" id="{B64EE3A0-6BB8-4CAA-B848-1B913E221139}"/>
+              </a:ext>
+            </a:extLst>
+          </p:cNvPr>
+          <p:cNvPicPr>
+            <a:picLocks noChangeAspect="1"/>
+          </p:cNvPicPr>
+          <p:nvPr/>
+        </p:nvPicPr>
+        <p:blipFill>
+          <a:blip r:embed="rId2"/>
+          <a:stretch>
+            <a:fillRect/>
+          </a:stretch>
+        </p:blipFill>
         <p:spPr>
           <a:xfrm>
-            <a:off x="1652846" y="3238789"/>
-            <a:ext cx="9552709" cy="884324"/>
+            <a:off x="1068796" y="1712662"/>
+            <a:ext cx="10054407" cy="3887704"/>
           </a:xfrm>
+          <a:prstGeom prst="rect">
+            <a:avLst/>
+          </a:prstGeom>
         </p:spPr>
-        <p:txBody>
-          <a:bodyPr>
-            <a:normAutofit/>
-          </a:bodyPr>
-          <a:lstStyle/>
-          <a:p>
-            <a:pPr marL="0" indent="0">
-              <a:buNone/>
-            </a:pPr>
-            <a:r>
-              <a:rPr lang="en-GB" sz="3200" dirty="0">
-                <a:hlinkClick r:id="rId2"/>
-              </a:rPr>
-              <a:t>https://n8thangreen.github.io/Pakistan-workshop-site/</a:t>
-            </a:r>
-            <a:endParaRPr lang="en-GB" sz="3200" dirty="0"/>
-          </a:p>
-        </p:txBody>
-      </p:sp>
+      </p:pic>
     </p:spTree>
     <p:extLst>
       <p:ext uri="{BB962C8B-B14F-4D97-AF65-F5344CB8AC3E}">
-        <p14:creationId xmlns:p14="http://schemas.microsoft.com/office/powerpoint/2010/main" val="776843318"/>
+        <p14:creationId xmlns:p14="http://schemas.microsoft.com/office/powerpoint/2010/main" val="2652614107"/>
       </p:ext>
     </p:extLst>
   </p:cSld>
@@ -9410,7 +9583,7 @@
           <p:cNvPr id="2" name="Title 1">
             <a:extLst>
               <a:ext uri="{FF2B5EF4-FFF2-40B4-BE49-F238E27FC236}">
-                <a16:creationId xmlns:a16="http://schemas.microsoft.com/office/drawing/2014/main" id="{9E87F50E-B545-48D3-9E91-447452099F84}"/>
+                <a16:creationId xmlns:a16="http://schemas.microsoft.com/office/drawing/2014/main" id="{D0D8AE3A-85C1-48AF-B111-D6E671501F03}"/>
               </a:ext>
             </a:extLst>
           </p:cNvPr>
@@ -9435,7 +9608,7 @@
           <p:cNvPr id="3" name="Content Placeholder 2">
             <a:extLst>
               <a:ext uri="{FF2B5EF4-FFF2-40B4-BE49-F238E27FC236}">
-                <a16:creationId xmlns:a16="http://schemas.microsoft.com/office/drawing/2014/main" id="{39640367-5016-4745-9C2A-DB9928419484}"/>
+                <a16:creationId xmlns:a16="http://schemas.microsoft.com/office/drawing/2014/main" id="{5A3435CE-5856-4385-ABBE-78F3250EAA58}"/>
               </a:ext>
             </a:extLst>
           </p:cNvPr>
@@ -9460,7 +9633,7 @@
           <p:cNvPr id="4" name="Picture 3">
             <a:extLst>
               <a:ext uri="{FF2B5EF4-FFF2-40B4-BE49-F238E27FC236}">
-                <a16:creationId xmlns:a16="http://schemas.microsoft.com/office/drawing/2014/main" id="{8A395C2F-E2A4-4F09-9799-3353BB0148E9}"/>
+                <a16:creationId xmlns:a16="http://schemas.microsoft.com/office/drawing/2014/main" id="{483E2E84-9FBD-48CF-867D-11E1C6AB1503}"/>
               </a:ext>
             </a:extLst>
           </p:cNvPr>
@@ -9477,8 +9650,8 @@
         </p:blipFill>
         <p:spPr>
           <a:xfrm>
-            <a:off x="4176416" y="0"/>
-            <a:ext cx="3839167" cy="6858000"/>
+            <a:off x="1292585" y="1825625"/>
+            <a:ext cx="9925609" cy="3768892"/>
           </a:xfrm>
           <a:prstGeom prst="rect">
             <a:avLst/>
@@ -9488,7 +9661,7 @@
     </p:spTree>
     <p:extLst>
       <p:ext uri="{BB962C8B-B14F-4D97-AF65-F5344CB8AC3E}">
-        <p14:creationId xmlns:p14="http://schemas.microsoft.com/office/powerpoint/2010/main" val="2090405719"/>
+        <p14:creationId xmlns:p14="http://schemas.microsoft.com/office/powerpoint/2010/main" val="3908225808"/>
       </p:ext>
     </p:extLst>
   </p:cSld>
@@ -9520,7 +9693,7 @@
           <p:cNvPr id="2" name="Title 1">
             <a:extLst>
               <a:ext uri="{FF2B5EF4-FFF2-40B4-BE49-F238E27FC236}">
-                <a16:creationId xmlns:a16="http://schemas.microsoft.com/office/drawing/2014/main" id="{756F2C3F-BE2A-4D2A-8146-226D29DA6E2F}"/>
+                <a16:creationId xmlns:a16="http://schemas.microsoft.com/office/drawing/2014/main" id="{69F93677-A158-495E-A4BE-0EE7280DCFD8}"/>
               </a:ext>
             </a:extLst>
           </p:cNvPr>
@@ -9538,7 +9711,7 @@
           <a:p>
             <a:r>
               <a:rPr lang="en-GB" dirty="0"/>
-              <a:t>Code of conduct</a:t>
+              <a:t>Course website</a:t>
             </a:r>
           </a:p>
         </p:txBody>
@@ -9548,7 +9721,7 @@
           <p:cNvPr id="3" name="Content Placeholder 2">
             <a:extLst>
               <a:ext uri="{FF2B5EF4-FFF2-40B4-BE49-F238E27FC236}">
-                <a16:creationId xmlns:a16="http://schemas.microsoft.com/office/drawing/2014/main" id="{E7BD1712-A824-464D-AE89-E9615CDCE38F}"/>
+                <a16:creationId xmlns:a16="http://schemas.microsoft.com/office/drawing/2014/main" id="{C4E401E2-D5DF-48FE-9F1E-60BD72CF87E8}"/>
               </a:ext>
             </a:extLst>
           </p:cNvPr>
@@ -9559,46 +9732,35 @@
             <p:ph idx="1"/>
           </p:nvPr>
         </p:nvSpPr>
-        <p:spPr/>
-        <p:txBody>
-          <a:bodyPr/>
+        <p:spPr>
+          <a:xfrm>
+            <a:off x="1652846" y="3238789"/>
+            <a:ext cx="9552709" cy="884324"/>
+          </a:xfrm>
+        </p:spPr>
+        <p:txBody>
+          <a:bodyPr>
+            <a:normAutofit/>
+          </a:bodyPr>
           <a:lstStyle/>
           <a:p>
-            <a:r>
-              <a:rPr lang="en-GB" dirty="0"/>
-              <a:t>Please ask questions</a:t>
-            </a:r>
-          </a:p>
-          <a:p>
-            <a:r>
-              <a:rPr lang="en-GB" dirty="0"/>
-              <a:t>Be curious</a:t>
-            </a:r>
-          </a:p>
-          <a:p>
-            <a:r>
-              <a:rPr lang="en-GB" dirty="0"/>
-              <a:t>Make mistakes</a:t>
-            </a:r>
-          </a:p>
-          <a:p>
-            <a:r>
-              <a:rPr lang="en-GB" dirty="0"/>
-              <a:t>Practices makes perfect</a:t>
-            </a:r>
-          </a:p>
-          <a:p>
-            <a:r>
-              <a:rPr lang="en-GB" dirty="0"/>
-              <a:t>Have fun!</a:t>
-            </a:r>
+            <a:pPr marL="0" indent="0">
+              <a:buNone/>
+            </a:pPr>
+            <a:r>
+              <a:rPr lang="en-GB" sz="3200" dirty="0">
+                <a:hlinkClick r:id="rId2"/>
+              </a:rPr>
+              <a:t>https://n8thangreen.github.io/Pakistan-workshop-site/</a:t>
+            </a:r>
+            <a:endParaRPr lang="en-GB" sz="3200" dirty="0"/>
           </a:p>
         </p:txBody>
       </p:sp>
     </p:spTree>
     <p:extLst>
       <p:ext uri="{BB962C8B-B14F-4D97-AF65-F5344CB8AC3E}">
-        <p14:creationId xmlns:p14="http://schemas.microsoft.com/office/powerpoint/2010/main" val="2695424799"/>
+        <p14:creationId xmlns:p14="http://schemas.microsoft.com/office/powerpoint/2010/main" val="776843318"/>
       </p:ext>
     </p:extLst>
   </p:cSld>

</xml_diff>